<commit_message>
Updated the objective portion of the presentation
</commit_message>
<xml_diff>
--- a/MaJicK Migration.pptx
+++ b/MaJicK Migration.pptx
@@ -8344,13 +8344,13 @@
           <a:p>
             <a:r>
               <a:rPr lang="en-US" dirty="0"/>
-              <a:t>Investigate the change in pattern</a:t>
+              <a:t>Investigate the change in migrating pattern</a:t>
             </a:r>
           </a:p>
           <a:p>
             <a:r>
               <a:rPr lang="en-US" dirty="0"/>
-              <a:t>Link trend with environmental factors </a:t>
+              <a:t>Influence of environmental factors on migrating pattern</a:t>
             </a:r>
           </a:p>
         </p:txBody>

</xml_diff>